<commit_message>
fix links and add Anderson's lesson fixes (pt)
</commit_message>
<xml_diff>
--- a/pt/ProgrammingLessons/Challenges.pptx
+++ b/pt/ProgrammingLessons/Challenges.pptx
@@ -135,6 +135,190 @@
 </p:presentation>
 </file>
 
+<file path=ppt/revisionInfo.xml><?xml version="1.0" encoding="utf-8"?>
+<p1510:revInfo xmlns:a="http://schemas.openxmlformats.org/drawingml/2006/main" xmlns:r="http://schemas.openxmlformats.org/officeDocument/2006/relationships" xmlns:p1510="http://schemas.microsoft.com/office/powerpoint/2015/10/main">
+  <p1510:revLst>
+    <p1510:client id="{A81B77B4-EE89-4373-999B-7365FB8A70F6}" v="5" dt="2020-07-13T06:20:13.470"/>
+  </p1510:revLst>
+</p1510:revInfo>
+</file>
+
+<file path=ppt/changesInfos/changesInfo1.xml><?xml version="1.0" encoding="utf-8"?>
+<pc:chgInfo xmlns:a="http://schemas.openxmlformats.org/drawingml/2006/main" xmlns:r="http://schemas.openxmlformats.org/officeDocument/2006/relationships" xmlns:ac="http://schemas.microsoft.com/office/drawing/2013/main/command" xmlns:pc="http://schemas.microsoft.com/office/powerpoint/2013/main/command">
+  <pc:docChgLst>
+    <pc:chgData name="Anderson Harayashiki Moreira" userId="07ffc975ff648281" providerId="LiveId" clId="{A81B77B4-EE89-4373-999B-7365FB8A70F6}"/>
+    <pc:docChg chg="custSel modSld">
+      <pc:chgData name="Anderson Harayashiki Moreira" userId="07ffc975ff648281" providerId="LiveId" clId="{A81B77B4-EE89-4373-999B-7365FB8A70F6}" dt="2020-07-13T06:20:13.470" v="73"/>
+      <pc:docMkLst>
+        <pc:docMk/>
+      </pc:docMkLst>
+      <pc:sldChg chg="modSp">
+        <pc:chgData name="Anderson Harayashiki Moreira" userId="07ffc975ff648281" providerId="LiveId" clId="{A81B77B4-EE89-4373-999B-7365FB8A70F6}" dt="2020-07-13T06:19:55.701" v="63" actId="20577"/>
+        <pc:sldMkLst>
+          <pc:docMk/>
+          <pc:sldMk cId="3392129947" sldId="288"/>
+        </pc:sldMkLst>
+        <pc:spChg chg="mod">
+          <ac:chgData name="Anderson Harayashiki Moreira" userId="07ffc975ff648281" providerId="LiveId" clId="{A81B77B4-EE89-4373-999B-7365FB8A70F6}" dt="2020-07-13T06:19:47.932" v="59" actId="20577"/>
+          <ac:spMkLst>
+            <pc:docMk/>
+            <pc:sldMk cId="3392129947" sldId="288"/>
+            <ac:spMk id="3" creationId="{00000000-0000-0000-0000-000000000000}"/>
+          </ac:spMkLst>
+        </pc:spChg>
+        <pc:spChg chg="mod">
+          <ac:chgData name="Anderson Harayashiki Moreira" userId="07ffc975ff648281" providerId="LiveId" clId="{A81B77B4-EE89-4373-999B-7365FB8A70F6}" dt="2020-07-13T06:19:55.701" v="63" actId="20577"/>
+          <ac:spMkLst>
+            <pc:docMk/>
+            <pc:sldMk cId="3392129947" sldId="288"/>
+            <ac:spMk id="4" creationId="{00000000-0000-0000-0000-000000000000}"/>
+          </ac:spMkLst>
+        </pc:spChg>
+      </pc:sldChg>
+      <pc:sldChg chg="addSp delSp modSp">
+        <pc:chgData name="Anderson Harayashiki Moreira" userId="07ffc975ff648281" providerId="LiveId" clId="{A81B77B4-EE89-4373-999B-7365FB8A70F6}" dt="2020-07-13T06:20:13.470" v="73"/>
+        <pc:sldMkLst>
+          <pc:docMk/>
+          <pc:sldMk cId="991901170" sldId="415"/>
+        </pc:sldMkLst>
+        <pc:spChg chg="mod">
+          <ac:chgData name="Anderson Harayashiki Moreira" userId="07ffc975ff648281" providerId="LiveId" clId="{A81B77B4-EE89-4373-999B-7365FB8A70F6}" dt="2020-07-13T06:16:55.924" v="1" actId="14100"/>
+          <ac:spMkLst>
+            <pc:docMk/>
+            <pc:sldMk cId="991901170" sldId="415"/>
+            <ac:spMk id="3" creationId="{00000000-0000-0000-0000-000000000000}"/>
+          </ac:spMkLst>
+        </pc:spChg>
+        <pc:spChg chg="del">
+          <ac:chgData name="Anderson Harayashiki Moreira" userId="07ffc975ff648281" providerId="LiveId" clId="{A81B77B4-EE89-4373-999B-7365FB8A70F6}" dt="2020-07-13T06:20:12.882" v="72" actId="478"/>
+          <ac:spMkLst>
+            <pc:docMk/>
+            <pc:sldMk cId="991901170" sldId="415"/>
+            <ac:spMk id="4" creationId="{00000000-0000-0000-0000-000000000000}"/>
+          </ac:spMkLst>
+        </pc:spChg>
+        <pc:spChg chg="add">
+          <ac:chgData name="Anderson Harayashiki Moreira" userId="07ffc975ff648281" providerId="LiveId" clId="{A81B77B4-EE89-4373-999B-7365FB8A70F6}" dt="2020-07-13T06:20:13.470" v="73"/>
+          <ac:spMkLst>
+            <pc:docMk/>
+            <pc:sldMk cId="991901170" sldId="415"/>
+            <ac:spMk id="10" creationId="{01EC5FD6-D393-45DB-AF40-2974B83E73E6}"/>
+          </ac:spMkLst>
+        </pc:spChg>
+      </pc:sldChg>
+      <pc:sldChg chg="addSp delSp modSp">
+        <pc:chgData name="Anderson Harayashiki Moreira" userId="07ffc975ff648281" providerId="LiveId" clId="{A81B77B4-EE89-4373-999B-7365FB8A70F6}" dt="2020-07-13T06:20:10.945" v="71"/>
+        <pc:sldMkLst>
+          <pc:docMk/>
+          <pc:sldMk cId="1079543850" sldId="417"/>
+        </pc:sldMkLst>
+        <pc:spChg chg="mod">
+          <ac:chgData name="Anderson Harayashiki Moreira" userId="07ffc975ff648281" providerId="LiveId" clId="{A81B77B4-EE89-4373-999B-7365FB8A70F6}" dt="2020-07-13T06:18:00.304" v="7" actId="20577"/>
+          <ac:spMkLst>
+            <pc:docMk/>
+            <pc:sldMk cId="1079543850" sldId="417"/>
+            <ac:spMk id="2" creationId="{00000000-0000-0000-0000-000000000000}"/>
+          </ac:spMkLst>
+        </pc:spChg>
+        <pc:spChg chg="del">
+          <ac:chgData name="Anderson Harayashiki Moreira" userId="07ffc975ff648281" providerId="LiveId" clId="{A81B77B4-EE89-4373-999B-7365FB8A70F6}" dt="2020-07-13T06:20:10.273" v="70" actId="478"/>
+          <ac:spMkLst>
+            <pc:docMk/>
+            <pc:sldMk cId="1079543850" sldId="417"/>
+            <ac:spMk id="4" creationId="{00000000-0000-0000-0000-000000000000}"/>
+          </ac:spMkLst>
+        </pc:spChg>
+        <pc:spChg chg="mod">
+          <ac:chgData name="Anderson Harayashiki Moreira" userId="07ffc975ff648281" providerId="LiveId" clId="{A81B77B4-EE89-4373-999B-7365FB8A70F6}" dt="2020-07-13T06:18:17.344" v="9" actId="14100"/>
+          <ac:spMkLst>
+            <pc:docMk/>
+            <pc:sldMk cId="1079543850" sldId="417"/>
+            <ac:spMk id="15" creationId="{00000000-0000-0000-0000-000000000000}"/>
+          </ac:spMkLst>
+        </pc:spChg>
+        <pc:spChg chg="add">
+          <ac:chgData name="Anderson Harayashiki Moreira" userId="07ffc975ff648281" providerId="LiveId" clId="{A81B77B4-EE89-4373-999B-7365FB8A70F6}" dt="2020-07-13T06:20:10.945" v="71"/>
+          <ac:spMkLst>
+            <pc:docMk/>
+            <pc:sldMk cId="1079543850" sldId="417"/>
+            <ac:spMk id="16" creationId="{984D0D99-CB44-45A5-B8A3-5BAD07CF3F4B}"/>
+          </ac:spMkLst>
+        </pc:spChg>
+      </pc:sldChg>
+      <pc:sldChg chg="addSp delSp">
+        <pc:chgData name="Anderson Harayashiki Moreira" userId="07ffc975ff648281" providerId="LiveId" clId="{A81B77B4-EE89-4373-999B-7365FB8A70F6}" dt="2020-07-13T06:20:07.994" v="69"/>
+        <pc:sldMkLst>
+          <pc:docMk/>
+          <pc:sldMk cId="3896260032" sldId="418"/>
+        </pc:sldMkLst>
+        <pc:spChg chg="del">
+          <ac:chgData name="Anderson Harayashiki Moreira" userId="07ffc975ff648281" providerId="LiveId" clId="{A81B77B4-EE89-4373-999B-7365FB8A70F6}" dt="2020-07-13T06:20:07.349" v="68" actId="478"/>
+          <ac:spMkLst>
+            <pc:docMk/>
+            <pc:sldMk cId="3896260032" sldId="418"/>
+            <ac:spMk id="4" creationId="{00000000-0000-0000-0000-000000000000}"/>
+          </ac:spMkLst>
+        </pc:spChg>
+        <pc:spChg chg="add">
+          <ac:chgData name="Anderson Harayashiki Moreira" userId="07ffc975ff648281" providerId="LiveId" clId="{A81B77B4-EE89-4373-999B-7365FB8A70F6}" dt="2020-07-13T06:20:07.994" v="69"/>
+          <ac:spMkLst>
+            <pc:docMk/>
+            <pc:sldMk cId="3896260032" sldId="418"/>
+            <ac:spMk id="33" creationId="{7C13BA78-2399-48F2-8EF0-5D8B3D0B0F17}"/>
+          </ac:spMkLst>
+        </pc:spChg>
+      </pc:sldChg>
+      <pc:sldChg chg="addSp delSp">
+        <pc:chgData name="Anderson Harayashiki Moreira" userId="07ffc975ff648281" providerId="LiveId" clId="{A81B77B4-EE89-4373-999B-7365FB8A70F6}" dt="2020-07-13T06:20:01.932" v="65"/>
+        <pc:sldMkLst>
+          <pc:docMk/>
+          <pc:sldMk cId="1916618733" sldId="419"/>
+        </pc:sldMkLst>
+        <pc:spChg chg="del">
+          <ac:chgData name="Anderson Harayashiki Moreira" userId="07ffc975ff648281" providerId="LiveId" clId="{A81B77B4-EE89-4373-999B-7365FB8A70F6}" dt="2020-07-13T06:20:01.505" v="64" actId="478"/>
+          <ac:spMkLst>
+            <pc:docMk/>
+            <pc:sldMk cId="1916618733" sldId="419"/>
+            <ac:spMk id="4" creationId="{00000000-0000-0000-0000-000000000000}"/>
+          </ac:spMkLst>
+        </pc:spChg>
+        <pc:spChg chg="add">
+          <ac:chgData name="Anderson Harayashiki Moreira" userId="07ffc975ff648281" providerId="LiveId" clId="{A81B77B4-EE89-4373-999B-7365FB8A70F6}" dt="2020-07-13T06:20:01.932" v="65"/>
+          <ac:spMkLst>
+            <pc:docMk/>
+            <pc:sldMk cId="1916618733" sldId="419"/>
+            <ac:spMk id="16" creationId="{DDB9F15F-B373-4E4A-B654-0A959E524702}"/>
+          </ac:spMkLst>
+        </pc:spChg>
+      </pc:sldChg>
+      <pc:sldChg chg="addSp delSp">
+        <pc:chgData name="Anderson Harayashiki Moreira" userId="07ffc975ff648281" providerId="LiveId" clId="{A81B77B4-EE89-4373-999B-7365FB8A70F6}" dt="2020-07-13T06:20:05.237" v="67"/>
+        <pc:sldMkLst>
+          <pc:docMk/>
+          <pc:sldMk cId="234350241" sldId="420"/>
+        </pc:sldMkLst>
+        <pc:spChg chg="del">
+          <ac:chgData name="Anderson Harayashiki Moreira" userId="07ffc975ff648281" providerId="LiveId" clId="{A81B77B4-EE89-4373-999B-7365FB8A70F6}" dt="2020-07-13T06:20:04.465" v="66" actId="478"/>
+          <ac:spMkLst>
+            <pc:docMk/>
+            <pc:sldMk cId="234350241" sldId="420"/>
+            <ac:spMk id="4" creationId="{00000000-0000-0000-0000-000000000000}"/>
+          </ac:spMkLst>
+        </pc:spChg>
+        <pc:spChg chg="add">
+          <ac:chgData name="Anderson Harayashiki Moreira" userId="07ffc975ff648281" providerId="LiveId" clId="{A81B77B4-EE89-4373-999B-7365FB8A70F6}" dt="2020-07-13T06:20:05.237" v="67"/>
+          <ac:spMkLst>
+            <pc:docMk/>
+            <pc:sldMk cId="234350241" sldId="420"/>
+            <ac:spMk id="25" creationId="{AEED7D9F-72C5-4211-9A40-E4E3A1D25500}"/>
+          </ac:spMkLst>
+        </pc:spChg>
+      </pc:sldChg>
+    </pc:docChg>
+  </pc:docChgLst>
+</pc:chgInfo>
+</file>
+
 <file path=ppt/handoutMasters/handoutMaster1.xml><?xml version="1.0" encoding="utf-8"?>
 <p:handoutMaster xmlns:a="http://schemas.openxmlformats.org/drawingml/2006/main" xmlns:r="http://schemas.openxmlformats.org/officeDocument/2006/relationships" xmlns:p="http://schemas.openxmlformats.org/presentationml/2006/main">
   <p:cSld>
@@ -217,7 +401,7 @@
           <a:p>
             <a:fld id="{58040048-1E4D-CD41-AC49-0750EB72586B}" type="datetimeFigureOut">
               <a:rPr lang="en-US" smtClean="0"/>
-              <a:t>6/11/2020</a:t>
+              <a:t>7/13/2020</a:t>
             </a:fld>
             <a:endParaRPr lang="en-US" dirty="0"/>
           </a:p>
@@ -383,7 +567,7 @@
           <a:p>
             <a:fld id="{2B8484CF-5098-F24E-8881-583515D5C406}" type="datetimeFigureOut">
               <a:rPr lang="en-US" smtClean="0"/>
-              <a:t>6/11/2020</a:t>
+              <a:t>7/13/2020</a:t>
             </a:fld>
             <a:endParaRPr lang="en-US" dirty="0"/>
           </a:p>
@@ -5838,7 +6022,7 @@
         <p:spPr>
           <a:xfrm>
             <a:off x="155089" y="1140006"/>
-            <a:ext cx="5355098" cy="5082601"/>
+            <a:ext cx="5098315" cy="5082601"/>
           </a:xfrm>
         </p:spPr>
         <p:txBody>
@@ -5847,53 +6031,36 @@
           </a:bodyPr>
           <a:lstStyle/>
           <a:p>
+            <a:pPr algn="just"/>
             <a:r>
               <a:rPr lang="pt-BR" dirty="0"/>
               <a:t>O objetivo destes desafios é juntar tudo o que você aprendeu até agora: Movimento, curvas e uso básico de sensores.</a:t>
             </a:r>
           </a:p>
           <a:p>
+            <a:pPr algn="just"/>
             <a:r>
               <a:rPr lang="pt-BR" dirty="0"/>
               <a:t>Você pode montar estes desafios usando fita isolante colorida em um quadro branco. Você também pode usar um banner grande branco em um piso liso e nivelado.</a:t>
             </a:r>
           </a:p>
           <a:p>
+            <a:pPr algn="just"/>
             <a:r>
               <a:rPr lang="pt-BR" dirty="0"/>
               <a:t>Note que as cores de fita isolante colorida não são iguais as cores usadas pela LEGO, seu sensor pode ter problemas na leitura.</a:t>
             </a:r>
           </a:p>
           <a:p>
+            <a:pPr algn="just"/>
             <a:r>
               <a:rPr lang="pt-BR" dirty="0"/>
               <a:t>Você também pode usar tapetes antigos da FLL.</a:t>
             </a:r>
           </a:p>
           <a:p>
+            <a:pPr algn="just"/>
             <a:endParaRPr lang="en-US" dirty="0"/>
-          </a:p>
-        </p:txBody>
-      </p:sp>
-      <p:sp>
-        <p:nvSpPr>
-          <p:cNvPr id="4" name="Footer Placeholder 3"/>
-          <p:cNvSpPr>
-            <a:spLocks noGrp="1"/>
-          </p:cNvSpPr>
-          <p:nvPr>
-            <p:ph type="ftr" sz="quarter" idx="11"/>
-          </p:nvPr>
-        </p:nvSpPr>
-        <p:spPr/>
-        <p:txBody>
-          <a:bodyPr/>
-          <a:lstStyle/>
-          <a:p>
-            <a:r>
-              <a:rPr lang="en-US" dirty="0"/>
-              <a:t>Copyright © 2020 SPIKE Prime Lessons (primelessons.org) CC-BY-NC-SA.  (Last edit: 1/9/2020)</a:t>
-            </a:r>
           </a:p>
         </p:txBody>
       </p:sp>
@@ -6170,6 +6337,39 @@
           </a:prstGeom>
         </p:spPr>
       </p:pic>
+      <p:sp>
+        <p:nvSpPr>
+          <p:cNvPr id="10" name="Footer Placeholder 3">
+            <a:extLst>
+              <a:ext uri="{FF2B5EF4-FFF2-40B4-BE49-F238E27FC236}">
+                <a16:creationId xmlns:a16="http://schemas.microsoft.com/office/drawing/2014/main" id="{01EC5FD6-D393-45DB-AF40-2974B83E73E6}"/>
+              </a:ext>
+            </a:extLst>
+          </p:cNvPr>
+          <p:cNvSpPr>
+            <a:spLocks noGrp="1"/>
+          </p:cNvSpPr>
+          <p:nvPr>
+            <p:ph type="ftr" sz="quarter" idx="11"/>
+          </p:nvPr>
+        </p:nvSpPr>
+        <p:spPr>
+          <a:xfrm>
+            <a:off x="88409" y="6320275"/>
+            <a:ext cx="4870585" cy="365125"/>
+          </a:xfrm>
+        </p:spPr>
+        <p:txBody>
+          <a:bodyPr/>
+          <a:lstStyle/>
+          <a:p>
+            <a:r>
+              <a:rPr lang="en-US" dirty="0"/>
+              <a:t>Copyright © 2020 SPIKE Prime Lessons (primelessons.org) CC-BY-NC-SA.  (Last edit: 07/13/2020)</a:t>
+            </a:r>
+          </a:p>
+        </p:txBody>
+      </p:sp>
     </p:spTree>
     <p:extLst>
       <p:ext uri="{BB962C8B-B14F-4D97-AF65-F5344CB8AC3E}">
@@ -6226,30 +6426,13 @@
             </a:br>
             <a:r>
               <a:rPr lang="en-US" dirty="0"/>
-              <a:t>Praticando andar reto e curvas</a:t>
-            </a:r>
-          </a:p>
-        </p:txBody>
-      </p:sp>
-      <p:sp>
-        <p:nvSpPr>
-          <p:cNvPr id="4" name="Footer Placeholder 3"/>
-          <p:cNvSpPr>
-            <a:spLocks noGrp="1"/>
-          </p:cNvSpPr>
-          <p:nvPr>
-            <p:ph type="ftr" sz="quarter" idx="11"/>
-          </p:nvPr>
-        </p:nvSpPr>
-        <p:spPr/>
-        <p:txBody>
-          <a:bodyPr/>
-          <a:lstStyle/>
-          <a:p>
-            <a:r>
-              <a:rPr lang="en-US" dirty="0"/>
-              <a:t>Copyright © 2020 SPIKE Prime Lessons (primelessons.org) CC-BY-NC-SA.  (Last edit: 1/9/2020)</a:t>
-            </a:r>
+              <a:t>Praticando andar reto e FAZER </a:t>
+            </a:r>
+            <a:r>
+              <a:rPr lang="en-US" dirty="0" err="1"/>
+              <a:t>curvas</a:t>
+            </a:r>
+            <a:endParaRPr lang="en-US" dirty="0"/>
           </a:p>
         </p:txBody>
       </p:sp>
@@ -6411,8 +6594,8 @@
         </p:nvSpPr>
         <p:spPr>
           <a:xfrm>
-            <a:off x="5920405" y="1562995"/>
-            <a:ext cx="2867761" cy="2093088"/>
+            <a:off x="5920406" y="1562995"/>
+            <a:ext cx="2038028" cy="2093088"/>
           </a:xfrm>
           <a:prstGeom prst="rect">
             <a:avLst/>
@@ -6439,7 +6622,7 @@
           <a:bodyPr rtlCol="0" anchor="ctr"/>
           <a:lstStyle/>
           <a:p>
-            <a:pPr marL="342900" indent="-342900">
+            <a:pPr marL="342900" indent="-342900" algn="just">
               <a:buAutoNum type="arabicParenR"/>
             </a:pPr>
             <a:r>
@@ -6448,7 +6631,7 @@
             </a:r>
           </a:p>
           <a:p>
-            <a:pPr marL="342900" indent="-342900">
+            <a:pPr marL="342900" indent="-342900" algn="just">
               <a:buAutoNum type="arabicParenR"/>
             </a:pPr>
             <a:r>
@@ -6457,7 +6640,7 @@
             </a:r>
           </a:p>
           <a:p>
-            <a:pPr marL="342900" indent="-342900">
+            <a:pPr marL="342900" indent="-342900" algn="just">
               <a:buAutoNum type="arabicParenR"/>
             </a:pPr>
             <a:r>
@@ -6466,7 +6649,7 @@
             </a:r>
           </a:p>
           <a:p>
-            <a:pPr marL="342900" indent="-342900">
+            <a:pPr marL="342900" indent="-342900" algn="just">
               <a:buAutoNum type="arabicParenR"/>
             </a:pPr>
             <a:r>
@@ -6713,6 +6896,39 @@
           </a:fontRef>
         </p:style>
       </p:cxnSp>
+      <p:sp>
+        <p:nvSpPr>
+          <p:cNvPr id="16" name="Footer Placeholder 3">
+            <a:extLst>
+              <a:ext uri="{FF2B5EF4-FFF2-40B4-BE49-F238E27FC236}">
+                <a16:creationId xmlns:a16="http://schemas.microsoft.com/office/drawing/2014/main" id="{984D0D99-CB44-45A5-B8A3-5BAD07CF3F4B}"/>
+              </a:ext>
+            </a:extLst>
+          </p:cNvPr>
+          <p:cNvSpPr>
+            <a:spLocks noGrp="1"/>
+          </p:cNvSpPr>
+          <p:nvPr>
+            <p:ph type="ftr" sz="quarter" idx="11"/>
+          </p:nvPr>
+        </p:nvSpPr>
+        <p:spPr>
+          <a:xfrm>
+            <a:off x="88409" y="6320275"/>
+            <a:ext cx="4870585" cy="365125"/>
+          </a:xfrm>
+        </p:spPr>
+        <p:txBody>
+          <a:bodyPr/>
+          <a:lstStyle/>
+          <a:p>
+            <a:r>
+              <a:rPr lang="en-US" dirty="0"/>
+              <a:t>Copyright © 2020 SPIKE Prime Lessons (primelessons.org) CC-BY-NC-SA.  (Last edit: 07/13/2020)</a:t>
+            </a:r>
+          </a:p>
+        </p:txBody>
+      </p:sp>
     </p:spTree>
     <p:extLst>
       <p:ext uri="{BB962C8B-B14F-4D97-AF65-F5344CB8AC3E}">
@@ -6761,28 +6977,6 @@
             <a:r>
               <a:rPr lang="en-US" dirty="0"/>
               <a:t>Desafio 2: Praticando o uso de sensores</a:t>
-            </a:r>
-          </a:p>
-        </p:txBody>
-      </p:sp>
-      <p:sp>
-        <p:nvSpPr>
-          <p:cNvPr id="4" name="Footer Placeholder 3"/>
-          <p:cNvSpPr>
-            <a:spLocks noGrp="1"/>
-          </p:cNvSpPr>
-          <p:nvPr>
-            <p:ph type="ftr" sz="quarter" idx="11"/>
-          </p:nvPr>
-        </p:nvSpPr>
-        <p:spPr/>
-        <p:txBody>
-          <a:bodyPr/>
-          <a:lstStyle/>
-          <a:p>
-            <a:r>
-              <a:rPr lang="en-US" dirty="0"/>
-              <a:t>Copyright © 2020 SPIKE Prime Lessons (primelessons.org) CC-BY-NC-SA.  (Last edit: 1/9/2020)</a:t>
             </a:r>
           </a:p>
         </p:txBody>
@@ -7605,7 +7799,7 @@
           <a:noFill/>
           <a:extLst>
             <a:ext uri="{909E8E84-426E-40dd-AFC4-6F175D3DCCD1}">
-              <a14:hiddenFill xmlns:a14="http://schemas.microsoft.com/office/drawing/2010/main" xmlns="">
+              <a14:hiddenFill xmlns="" xmlns:a14="http://schemas.microsoft.com/office/drawing/2010/main">
                 <a:solidFill>
                   <a:srgbClr val="FFFFFF"/>
                 </a:solidFill>
@@ -7650,6 +7844,39 @@
           </a:fontRef>
         </p:style>
       </p:cxnSp>
+      <p:sp>
+        <p:nvSpPr>
+          <p:cNvPr id="33" name="Footer Placeholder 3">
+            <a:extLst>
+              <a:ext uri="{FF2B5EF4-FFF2-40B4-BE49-F238E27FC236}">
+                <a16:creationId xmlns:a16="http://schemas.microsoft.com/office/drawing/2014/main" id="{7C13BA78-2399-48F2-8EF0-5D8B3D0B0F17}"/>
+              </a:ext>
+            </a:extLst>
+          </p:cNvPr>
+          <p:cNvSpPr>
+            <a:spLocks noGrp="1"/>
+          </p:cNvSpPr>
+          <p:nvPr>
+            <p:ph type="ftr" sz="quarter" idx="11"/>
+          </p:nvPr>
+        </p:nvSpPr>
+        <p:spPr>
+          <a:xfrm>
+            <a:off x="88409" y="6320275"/>
+            <a:ext cx="4870585" cy="365125"/>
+          </a:xfrm>
+        </p:spPr>
+        <p:txBody>
+          <a:bodyPr/>
+          <a:lstStyle/>
+          <a:p>
+            <a:r>
+              <a:rPr lang="en-US" dirty="0"/>
+              <a:t>Copyright © 2020 SPIKE Prime Lessons (primelessons.org) CC-BY-NC-SA.  (Last edit: 07/13/2020)</a:t>
+            </a:r>
+          </a:p>
+        </p:txBody>
+      </p:sp>
     </p:spTree>
     <p:extLst>
       <p:ext uri="{BB962C8B-B14F-4D97-AF65-F5344CB8AC3E}">
@@ -7700,28 +7927,6 @@
             <a:r>
               <a:rPr lang="en-US" dirty="0"/>
               <a:t>Desafio 3: Pegando um item</a:t>
-            </a:r>
-          </a:p>
-        </p:txBody>
-      </p:sp>
-      <p:sp>
-        <p:nvSpPr>
-          <p:cNvPr id="4" name="Footer Placeholder 3"/>
-          <p:cNvSpPr>
-            <a:spLocks noGrp="1"/>
-          </p:cNvSpPr>
-          <p:nvPr>
-            <p:ph type="ftr" sz="quarter" idx="11"/>
-          </p:nvPr>
-        </p:nvSpPr>
-        <p:spPr/>
-        <p:txBody>
-          <a:bodyPr/>
-          <a:lstStyle/>
-          <a:p>
-            <a:r>
-              <a:rPr lang="en-US" dirty="0"/>
-              <a:t>Copyright © 2020 SPIKE Prime Lessons (primelessons.org) CC-BY-NC-SA.  (Last edit: 1/9/2020)</a:t>
             </a:r>
           </a:p>
         </p:txBody>
@@ -8478,7 +8683,7 @@
           <a:noFill/>
           <a:extLst>
             <a:ext uri="{909E8E84-426E-40dd-AFC4-6F175D3DCCD1}">
-              <a14:hiddenFill xmlns:a14="http://schemas.microsoft.com/office/drawing/2010/main" xmlns="">
+              <a14:hiddenFill xmlns="" xmlns:a14="http://schemas.microsoft.com/office/drawing/2010/main">
                 <a:solidFill>
                   <a:srgbClr val="FFFFFF"/>
                 </a:solidFill>
@@ -8566,6 +8771,39 @@
           <a:p>
             <a:pPr algn="ctr"/>
             <a:endParaRPr lang="en-US" dirty="0"/>
+          </a:p>
+        </p:txBody>
+      </p:sp>
+      <p:sp>
+        <p:nvSpPr>
+          <p:cNvPr id="25" name="Footer Placeholder 3">
+            <a:extLst>
+              <a:ext uri="{FF2B5EF4-FFF2-40B4-BE49-F238E27FC236}">
+                <a16:creationId xmlns:a16="http://schemas.microsoft.com/office/drawing/2014/main" id="{AEED7D9F-72C5-4211-9A40-E4E3A1D25500}"/>
+              </a:ext>
+            </a:extLst>
+          </p:cNvPr>
+          <p:cNvSpPr>
+            <a:spLocks noGrp="1"/>
+          </p:cNvSpPr>
+          <p:nvPr>
+            <p:ph type="ftr" sz="quarter" idx="11"/>
+          </p:nvPr>
+        </p:nvSpPr>
+        <p:spPr>
+          <a:xfrm>
+            <a:off x="88409" y="6320275"/>
+            <a:ext cx="4870585" cy="365125"/>
+          </a:xfrm>
+        </p:spPr>
+        <p:txBody>
+          <a:bodyPr/>
+          <a:lstStyle/>
+          <a:p>
+            <a:r>
+              <a:rPr lang="en-US" dirty="0"/>
+              <a:t>Copyright © 2020 SPIKE Prime Lessons (primelessons.org) CC-BY-NC-SA.  (Last edit: 07/13/2020)</a:t>
+            </a:r>
           </a:p>
         </p:txBody>
       </p:sp>
@@ -8668,28 +8906,6 @@
           </a:p>
           <a:p>
             <a:endParaRPr lang="pt-BR" dirty="0"/>
-          </a:p>
-        </p:txBody>
-      </p:sp>
-      <p:sp>
-        <p:nvSpPr>
-          <p:cNvPr id="4" name="Footer Placeholder 3"/>
-          <p:cNvSpPr>
-            <a:spLocks noGrp="1"/>
-          </p:cNvSpPr>
-          <p:nvPr>
-            <p:ph type="ftr" sz="quarter" idx="11"/>
-          </p:nvPr>
-        </p:nvSpPr>
-        <p:spPr/>
-        <p:txBody>
-          <a:bodyPr/>
-          <a:lstStyle/>
-          <a:p>
-            <a:r>
-              <a:rPr lang="en-US" dirty="0"/>
-              <a:t>Copyright © 2020 SPIKE Prime Lessons (primelessons.org) CC-BY-NC-SA.  (Last edit: 1/9/2020)</a:t>
-            </a:r>
           </a:p>
         </p:txBody>
       </p:sp>
@@ -9551,6 +9767,39 @@
           </p:txBody>
         </p:sp>
       </p:grpSp>
+      <p:sp>
+        <p:nvSpPr>
+          <p:cNvPr id="16" name="Footer Placeholder 3">
+            <a:extLst>
+              <a:ext uri="{FF2B5EF4-FFF2-40B4-BE49-F238E27FC236}">
+                <a16:creationId xmlns:a16="http://schemas.microsoft.com/office/drawing/2014/main" id="{DDB9F15F-B373-4E4A-B654-0A959E524702}"/>
+              </a:ext>
+            </a:extLst>
+          </p:cNvPr>
+          <p:cNvSpPr>
+            <a:spLocks noGrp="1"/>
+          </p:cNvSpPr>
+          <p:nvPr>
+            <p:ph type="ftr" sz="quarter" idx="11"/>
+          </p:nvPr>
+        </p:nvSpPr>
+        <p:spPr>
+          <a:xfrm>
+            <a:off x="88409" y="6320275"/>
+            <a:ext cx="4870585" cy="365125"/>
+          </a:xfrm>
+        </p:spPr>
+        <p:txBody>
+          <a:bodyPr/>
+          <a:lstStyle/>
+          <a:p>
+            <a:r>
+              <a:rPr lang="en-US" dirty="0"/>
+              <a:t>Copyright © 2020 SPIKE Prime Lessons (primelessons.org) CC-BY-NC-SA.  (Last edit: 07/13/2020)</a:t>
+            </a:r>
+          </a:p>
+        </p:txBody>
+      </p:sp>
     </p:spTree>
     <p:extLst>
       <p:ext uri="{BB962C8B-B14F-4D97-AF65-F5344CB8AC3E}">
@@ -9646,7 +9895,15 @@
           <a:p>
             <a:r>
               <a:rPr lang="pt-BR" sz="1600" dirty="0"/>
-              <a:t>Traduzido para o português por Lucas Colonna</a:t>
+              <a:t>Traduzido para o português por Lucas </a:t>
+            </a:r>
+            <a:r>
+              <a:rPr lang="pt-BR" sz="1600" dirty="0" err="1"/>
+              <a:t>Colonna</a:t>
+            </a:r>
+            <a:r>
+              <a:rPr lang="pt-BR" sz="1600" dirty="0"/>
+              <a:t> e revisado por Anderson Harayashiki Moreira</a:t>
             </a:r>
           </a:p>
           <a:p>
@@ -9671,7 +9928,7 @@
           <a:p>
             <a:r>
               <a:rPr lang="en-US" dirty="0"/>
-              <a:t>Copyright © 2020 SPIKE Prime Lessons (primelessons.org) CC-BY-NC-SA.  (Last edit: 1/9/2020)</a:t>
+              <a:t>Copyright © 2020 SPIKE Prime Lessons (primelessons.org) CC-BY-NC-SA.  (Last edit: 07/13/2020)</a:t>
             </a:r>
           </a:p>
         </p:txBody>
@@ -9701,7 +9958,7 @@
           <a:effectLst/>
           <a:extLst>
             <a:ext uri="{91240B29-F687-4f45-9708-019B960494DF}">
-              <a14:hiddenLine xmlns="" xmlns:a14="http://schemas.microsoft.com/office/drawing/2010/main" w="9525">
+              <a14:hiddenLine xmlns:a14="http://schemas.microsoft.com/office/drawing/2010/main" xmlns="" w="9525">
                 <a:solidFill>
                   <a:schemeClr val="tx1"/>
                 </a:solidFill>
@@ -9711,7 +9968,7 @@
               </a14:hiddenLine>
             </a:ext>
             <a:ext uri="{AF507438-7753-43e0-B8FC-AC1667EBCBE1}">
-              <a14:hiddenEffects xmlns="" xmlns:a14="http://schemas.microsoft.com/office/drawing/2010/main">
+              <a14:hiddenEffects xmlns:a14="http://schemas.microsoft.com/office/drawing/2010/main" xmlns="">
                 <a:effectLst>
                   <a:outerShdw dist="35921" dir="2700000" algn="ctr" rotWithShape="0">
                     <a:schemeClr val="bg2"/>
@@ -9996,7 +10253,7 @@
           <a:noFill/>
           <a:extLst>
             <a:ext uri="{909E8E84-426E-40dd-AFC4-6F175D3DCCD1}">
-              <a14:hiddenFill xmlns="" xmlns:a14="http://schemas.microsoft.com/office/drawing/2010/main">
+              <a14:hiddenFill xmlns:a14="http://schemas.microsoft.com/office/drawing/2010/main" xmlns="">
                 <a:solidFill>
                   <a:srgbClr val="FFFFFF"/>
                 </a:solidFill>

</xml_diff>